<commit_message>
Add compiler pdf, python books
</commit_message>
<xml_diff>
--- a/计算机与信息类/编译原理和技术/homework&lab-郑启龙/lab2-pl0/src/display.pptx
+++ b/计算机与信息类/编译原理和技术/homework&lab-郑启龙/lab2-pl0/src/display.pptx
@@ -2957,43 +2957,6 @@
       </dgm:t>
     </dgm:pt>
     <dgm:pt modelId="{31373562-3311-4091-88FD-FBC8D6A7EF26}" type="sibTrans" cxnId="{AE0F6FD6-4E60-4BF5-8712-B0C779BC7D3B}">
-      <dgm:prSet/>
-      <dgm:spPr/>
-      <dgm:t>
-        <a:bodyPr/>
-        <a:lstStyle/>
-        <a:p>
-          <a:endParaRPr lang="zh-CN" altLang="en-US"/>
-        </a:p>
-      </dgm:t>
-    </dgm:pt>
-    <dgm:pt modelId="{8660B140-D3E1-4406-823F-4FD2A9D05E21}">
-      <dgm:prSet phldrT="[文本]"/>
-      <dgm:spPr/>
-      <dgm:t>
-        <a:bodyPr/>
-        <a:lstStyle/>
-        <a:p>
-          <a:r>
-            <a:rPr lang="en-US" altLang="zh-CN" dirty="0"/>
-            <a:t>odd</a:t>
-          </a:r>
-          <a:endParaRPr lang="zh-CN" altLang="en-US" dirty="0"/>
-        </a:p>
-      </dgm:t>
-    </dgm:pt>
-    <dgm:pt modelId="{467E9570-E1FB-4127-B0E7-C6B0B6713DCC}" type="parTrans" cxnId="{BF6EC2A2-40A6-4C41-98CE-C797EDE72714}">
-      <dgm:prSet/>
-      <dgm:spPr/>
-      <dgm:t>
-        <a:bodyPr/>
-        <a:lstStyle/>
-        <a:p>
-          <a:endParaRPr lang="zh-CN" altLang="en-US"/>
-        </a:p>
-      </dgm:t>
-    </dgm:pt>
-    <dgm:pt modelId="{A9F390FE-646A-4537-81DF-672DB2065E98}" type="sibTrans" cxnId="{BF6EC2A2-40A6-4C41-98CE-C797EDE72714}">
       <dgm:prSet/>
       <dgm:spPr/>
       <dgm:t>
@@ -3633,6 +3596,43 @@
         </a:p>
       </dgm:t>
     </dgm:pt>
+    <dgm:pt modelId="{D82B3010-2785-48C0-B6CA-BDC5829D8930}">
+      <dgm:prSet phldrT="[文本]"/>
+      <dgm:spPr/>
+      <dgm:t>
+        <a:bodyPr/>
+        <a:lstStyle/>
+        <a:p>
+          <a:r>
+            <a:rPr lang="en-US" altLang="zh-CN" dirty="0"/>
+            <a:t>odd</a:t>
+          </a:r>
+          <a:endParaRPr lang="zh-CN" altLang="en-US" dirty="0"/>
+        </a:p>
+      </dgm:t>
+    </dgm:pt>
+    <dgm:pt modelId="{BA10C1E9-FA5F-4389-8B9F-D3F5DAE5A1BA}" type="parTrans" cxnId="{34DC3C7F-645D-46A8-93FD-BB051C5FD018}">
+      <dgm:prSet/>
+      <dgm:spPr/>
+      <dgm:t>
+        <a:bodyPr/>
+        <a:lstStyle/>
+        <a:p>
+          <a:endParaRPr lang="zh-CN" altLang="en-US"/>
+        </a:p>
+      </dgm:t>
+    </dgm:pt>
+    <dgm:pt modelId="{B124133A-7B7D-4E2E-885D-50296119CDA4}" type="sibTrans" cxnId="{34DC3C7F-645D-46A8-93FD-BB051C5FD018}">
+      <dgm:prSet/>
+      <dgm:spPr/>
+      <dgm:t>
+        <a:bodyPr/>
+        <a:lstStyle/>
+        <a:p>
+          <a:endParaRPr lang="zh-CN" altLang="en-US"/>
+        </a:p>
+      </dgm:t>
+    </dgm:pt>
     <dgm:pt modelId="{84A7D3E3-7DAE-4219-B934-66A7C2AF2591}" type="pres">
       <dgm:prSet presAssocID="{5B8828BD-1B60-4F20-9FBE-08EDE9B43C0C}" presName="Name0" presStyleCnt="0">
         <dgm:presLayoutVars>
@@ -3658,7 +3658,7 @@
       <dgm:spPr/>
     </dgm:pt>
     <dgm:pt modelId="{8ED69AC3-1C3E-41B0-94A7-CB61300A7E4D}" type="pres">
-      <dgm:prSet presAssocID="{6A9063C9-393F-4713-994E-5DBC2E8793BA}" presName="desTx" presStyleLbl="alignAccFollowNode1" presStyleIdx="0" presStyleCnt="5">
+      <dgm:prSet presAssocID="{6A9063C9-393F-4713-994E-5DBC2E8793BA}" presName="desTx" presStyleLbl="alignAccFollowNode1" presStyleIdx="0" presStyleCnt="5" custLinFactNeighborX="-17630" custLinFactNeighborY="-2854">
         <dgm:presLayoutVars>
           <dgm:bulletEnabled val="1"/>
         </dgm:presLayoutVars>
@@ -3773,7 +3773,7 @@
   <dgm:cxnLst>
     <dgm:cxn modelId="{A75F4000-BD35-4D98-B716-1B87B9A8BDC8}" type="presOf" srcId="{DBD8F70C-BB94-409C-B7BC-5EBE4A9773C7}" destId="{42D7CF5D-C18A-48B9-BD5D-08D88E897DA7}" srcOrd="0" destOrd="0" presId="urn:microsoft.com/office/officeart/2005/8/layout/hList1"/>
     <dgm:cxn modelId="{32675304-E70D-4CFF-9D12-38F749F2382C}" type="presOf" srcId="{B63C832B-5D62-44B4-8237-D52EF0A02A4B}" destId="{3E32D730-F0BF-4384-AC5C-AF0A6956922B}" srcOrd="0" destOrd="3" presId="urn:microsoft.com/office/officeart/2005/8/layout/hList1"/>
-    <dgm:cxn modelId="{36D3230A-7A08-464C-ABCE-C1138ABAEA08}" srcId="{DBD8F70C-BB94-409C-B7BC-5EBE4A9773C7}" destId="{805B1E72-9212-40FA-BCE9-5FD4538F212E}" srcOrd="2" destOrd="0" parTransId="{D2730D98-20DA-4C33-8E19-4AE67216F4D2}" sibTransId="{FE844185-190D-418D-A5AC-9F6A90AF6EA1}"/>
+    <dgm:cxn modelId="{36D3230A-7A08-464C-ABCE-C1138ABAEA08}" srcId="{DBD8F70C-BB94-409C-B7BC-5EBE4A9773C7}" destId="{805B1E72-9212-40FA-BCE9-5FD4538F212E}" srcOrd="3" destOrd="0" parTransId="{D2730D98-20DA-4C33-8E19-4AE67216F4D2}" sibTransId="{FE844185-190D-418D-A5AC-9F6A90AF6EA1}"/>
     <dgm:cxn modelId="{F3F8E60D-95D9-4C3F-BA4D-DED23207DD79}" type="presOf" srcId="{611BF43D-6C23-4910-9A44-638D4F1E0045}" destId="{0C041889-D3CC-4E93-A706-82C5850D8CE2}" srcOrd="0" destOrd="0" presId="urn:microsoft.com/office/officeart/2005/8/layout/hList1"/>
     <dgm:cxn modelId="{AF4EB40E-BB6C-4151-BB48-6295A7803ECF}" type="presOf" srcId="{F0D8D7EF-C31D-4FF8-885C-DCA1912B680B}" destId="{3E32D730-F0BF-4384-AC5C-AF0A6956922B}" srcOrd="0" destOrd="1" presId="urn:microsoft.com/office/officeart/2005/8/layout/hList1"/>
     <dgm:cxn modelId="{04EC2E17-0738-47CC-AD78-A0DF378A5B14}" srcId="{5B8828BD-1B60-4F20-9FBE-08EDE9B43C0C}" destId="{E3CBA390-CCDA-4D24-8942-073B2FC3F82C}" srcOrd="3" destOrd="0" parTransId="{1D3B909D-1030-48AC-B2E9-395D1463CD01}" sibTransId="{8C66CD28-F546-410E-836D-34E5858CED67}"/>
@@ -3790,35 +3790,35 @@
     <dgm:cxn modelId="{B4A18347-FB54-4B11-9A62-9160B95978A4}" srcId="{5B8828BD-1B60-4F20-9FBE-08EDE9B43C0C}" destId="{DBD8F70C-BB94-409C-B7BC-5EBE4A9773C7}" srcOrd="4" destOrd="0" parTransId="{7AB74FA4-87E6-4764-BF77-F3D1D334B22E}" sibTransId="{43BE0CFD-2B3F-4C3C-A8DC-E2BDCE12C775}"/>
     <dgm:cxn modelId="{B7E45768-0D9E-403A-859F-4BE3018ACC3C}" type="presOf" srcId="{E3CBA390-CCDA-4D24-8942-073B2FC3F82C}" destId="{0CD0E88C-C690-4025-9877-FDB37C930DC4}" srcOrd="0" destOrd="0" presId="urn:microsoft.com/office/officeart/2005/8/layout/hList1"/>
     <dgm:cxn modelId="{34B4C74B-986A-4E4E-8CB2-98DCB7D572B8}" type="presOf" srcId="{8AFEA635-696C-4222-8530-6D71F2E6D57C}" destId="{0C041889-D3CC-4E93-A706-82C5850D8CE2}" srcOrd="0" destOrd="2" presId="urn:microsoft.com/office/officeart/2005/8/layout/hList1"/>
+    <dgm:cxn modelId="{12F0636C-6DAA-40F4-8AD3-F454786A5EB0}" type="presOf" srcId="{D82B3010-2785-48C0-B6CA-BDC5829D8930}" destId="{0540F95E-2AA8-42FE-9ED8-41467EEF0D2A}" srcOrd="0" destOrd="1" presId="urn:microsoft.com/office/officeart/2005/8/layout/hList1"/>
     <dgm:cxn modelId="{4D7D956E-EBDD-42C1-8836-7A5A7726534B}" type="presOf" srcId="{0EA15AD2-362E-4478-9B24-A0B73C7D4646}" destId="{0540F95E-2AA8-42FE-9ED8-41467EEF0D2A}" srcOrd="0" destOrd="0" presId="urn:microsoft.com/office/officeart/2005/8/layout/hList1"/>
     <dgm:cxn modelId="{0D977952-AA08-47F4-8A2F-495804600722}" srcId="{1A37949D-8DB7-4063-8B84-808827F2528D}" destId="{F0D8D7EF-C31D-4FF8-885C-DCA1912B680B}" srcOrd="1" destOrd="0" parTransId="{20F1ECF5-5B84-4A22-AE33-9F4A2FA4F579}" sibTransId="{16002CB9-BDFE-4E35-8CC0-A72B95901AA7}"/>
     <dgm:cxn modelId="{4FFC9675-A646-46FF-B082-47914F84FEC7}" type="presOf" srcId="{A8718C2D-8994-4211-8934-8B394130E700}" destId="{3E32D730-F0BF-4384-AC5C-AF0A6956922B}" srcOrd="0" destOrd="0" presId="urn:microsoft.com/office/officeart/2005/8/layout/hList1"/>
     <dgm:cxn modelId="{1192A857-92D6-4EDA-8662-73B4A920ACB0}" srcId="{5B8828BD-1B60-4F20-9FBE-08EDE9B43C0C}" destId="{B33C00E0-073A-4B44-A40D-88FCE3A8D6FD}" srcOrd="1" destOrd="0" parTransId="{F0E9898F-2643-42DC-8FE3-83E19D96A39D}" sibTransId="{2401A6F0-8BE9-4E72-AD2B-171159B8D7EE}"/>
     <dgm:cxn modelId="{DF2D5D78-7425-43B8-9C5A-90FFBD254A01}" type="presOf" srcId="{F4C1B31C-1007-45CB-BBBB-51410ACE1A1F}" destId="{8ED69AC3-1C3E-41B0-94A7-CB61300A7E4D}" srcOrd="0" destOrd="0" presId="urn:microsoft.com/office/officeart/2005/8/layout/hList1"/>
     <dgm:cxn modelId="{2986347F-2123-49E8-B110-F0EA313D2C0E}" srcId="{1A37949D-8DB7-4063-8B84-808827F2528D}" destId="{3F217062-4873-4029-9D58-E6B41E0CDE08}" srcOrd="2" destOrd="0" parTransId="{E620A90B-ACD4-4682-8CDE-668F730F3A70}" sibTransId="{16E74403-200E-4A67-9538-DCB953917D5F}"/>
+    <dgm:cxn modelId="{34DC3C7F-645D-46A8-93FD-BB051C5FD018}" srcId="{DBD8F70C-BB94-409C-B7BC-5EBE4A9773C7}" destId="{D82B3010-2785-48C0-B6CA-BDC5829D8930}" srcOrd="1" destOrd="0" parTransId="{BA10C1E9-FA5F-4389-8B9F-D3F5DAE5A1BA}" sibTransId="{B124133A-7B7D-4E2E-885D-50296119CDA4}"/>
     <dgm:cxn modelId="{A4112F88-B584-4DA8-837A-7895D6D0386C}" srcId="{DBD8F70C-BB94-409C-B7BC-5EBE4A9773C7}" destId="{0EA15AD2-362E-4478-9B24-A0B73C7D4646}" srcOrd="0" destOrd="0" parTransId="{55B8B95E-9DAC-429F-BA80-8884F0BCF2C2}" sibTransId="{1E5DBDDA-3C12-4266-9F05-6049EE7FA83A}"/>
     <dgm:cxn modelId="{B173698A-9AD0-4436-91A2-246B9D83B456}" srcId="{E3CBA390-CCDA-4D24-8942-073B2FC3F82C}" destId="{611BF43D-6C23-4910-9A44-638D4F1E0045}" srcOrd="0" destOrd="0" parTransId="{5257FED9-81F0-4B99-8D92-42ADAD27FA23}" sibTransId="{0048B1CA-0BC8-4F87-9F97-DA03875A367B}"/>
-    <dgm:cxn modelId="{73F3A99F-B123-4A08-9F78-518A24F0200B}" type="presOf" srcId="{44D14112-5418-4765-B504-23CF894F7A82}" destId="{0540F95E-2AA8-42FE-9ED8-41467EEF0D2A}" srcOrd="0" destOrd="1" presId="urn:microsoft.com/office/officeart/2005/8/layout/hList1"/>
-    <dgm:cxn modelId="{BF6EC2A2-40A6-4C41-98CE-C797EDE72714}" srcId="{6A9063C9-393F-4713-994E-5DBC2E8793BA}" destId="{8660B140-D3E1-4406-823F-4FD2A9D05E21}" srcOrd="3" destOrd="0" parTransId="{467E9570-E1FB-4127-B0E7-C6B0B6713DCC}" sibTransId="{A9F390FE-646A-4537-81DF-672DB2065E98}"/>
+    <dgm:cxn modelId="{73F3A99F-B123-4A08-9F78-518A24F0200B}" type="presOf" srcId="{44D14112-5418-4765-B504-23CF894F7A82}" destId="{0540F95E-2AA8-42FE-9ED8-41467EEF0D2A}" srcOrd="0" destOrd="2" presId="urn:microsoft.com/office/officeart/2005/8/layout/hList1"/>
     <dgm:cxn modelId="{D352E5A2-B74D-4CFC-B0A4-D05B385804CB}" srcId="{5B8828BD-1B60-4F20-9FBE-08EDE9B43C0C}" destId="{1A37949D-8DB7-4063-8B84-808827F2528D}" srcOrd="2" destOrd="0" parTransId="{585A6D09-A4BE-4268-939D-9D3B654A6BE4}" sibTransId="{B8665692-C044-4597-8196-B97982A7B5C0}"/>
     <dgm:cxn modelId="{7AA380A7-205A-43BC-851C-8F1E679397FC}" type="presOf" srcId="{6989082E-CE97-4632-854E-94C92301574B}" destId="{0C041889-D3CC-4E93-A706-82C5850D8CE2}" srcOrd="0" destOrd="3" presId="urn:microsoft.com/office/officeart/2005/8/layout/hList1"/>
     <dgm:cxn modelId="{290526B2-8FA0-471E-A58D-0ECA62E49424}" srcId="{E3CBA390-CCDA-4D24-8942-073B2FC3F82C}" destId="{6989082E-CE97-4632-854E-94C92301574B}" srcOrd="3" destOrd="0" parTransId="{0C282BA9-9904-42E8-9C3F-4E373915FC92}" sibTransId="{9260CA26-8719-4EC9-BD9B-0B76D9499CD0}"/>
     <dgm:cxn modelId="{FA622BB2-155E-423C-9A5C-54EAF120EED2}" type="presOf" srcId="{C4FB268F-993F-409E-9C97-A352B9BB7909}" destId="{273947A1-83A5-46FE-BF71-DD621ED741C4}" srcOrd="0" destOrd="3" presId="urn:microsoft.com/office/officeart/2005/8/layout/hList1"/>
-    <dgm:cxn modelId="{4F9A7AB3-1235-4DA0-B58F-36BBFE2E1F16}" type="presOf" srcId="{805B1E72-9212-40FA-BCE9-5FD4538F212E}" destId="{0540F95E-2AA8-42FE-9ED8-41467EEF0D2A}" srcOrd="0" destOrd="2" presId="urn:microsoft.com/office/officeart/2005/8/layout/hList1"/>
+    <dgm:cxn modelId="{4F9A7AB3-1235-4DA0-B58F-36BBFE2E1F16}" type="presOf" srcId="{805B1E72-9212-40FA-BCE9-5FD4538F212E}" destId="{0540F95E-2AA8-42FE-9ED8-41467EEF0D2A}" srcOrd="0" destOrd="3" presId="urn:microsoft.com/office/officeart/2005/8/layout/hList1"/>
     <dgm:cxn modelId="{10F21BBA-88C8-47CE-8852-4DE6B3E30CA7}" srcId="{E3CBA390-CCDA-4D24-8942-073B2FC3F82C}" destId="{DEEB43C2-1919-47FF-8EFC-90E007522825}" srcOrd="4" destOrd="0" parTransId="{D2CFE5A3-F147-4D72-B6F1-14364EB3B38D}" sibTransId="{AC0D03C6-8B5E-484C-A3CC-660B45E0C119}"/>
     <dgm:cxn modelId="{296B70BE-67BE-4927-9F9A-F26F2429A7B7}" type="presOf" srcId="{B33C00E0-073A-4B44-A40D-88FCE3A8D6FD}" destId="{4D3BFAE9-2EC0-4F19-85FD-239DA87C10B2}" srcOrd="0" destOrd="0" presId="urn:microsoft.com/office/officeart/2005/8/layout/hList1"/>
     <dgm:cxn modelId="{F04669CD-9D39-49CE-B1AD-C4713C88A4E9}" srcId="{E3CBA390-CCDA-4D24-8942-073B2FC3F82C}" destId="{8AFEA635-696C-4222-8530-6D71F2E6D57C}" srcOrd="2" destOrd="0" parTransId="{BC8ECF34-73F1-4007-B281-17BBE78942BC}" sibTransId="{58C8DC82-3A3F-4428-B30D-D25F4DD302CE}"/>
     <dgm:cxn modelId="{BE59AECF-1413-446F-BB55-7E7DD2B625C6}" type="presOf" srcId="{DEEB43C2-1919-47FF-8EFC-90E007522825}" destId="{0C041889-D3CC-4E93-A706-82C5850D8CE2}" srcOrd="0" destOrd="4" presId="urn:microsoft.com/office/officeart/2005/8/layout/hList1"/>
     <dgm:cxn modelId="{AA2FB6CF-E076-4FAA-9C64-4C2DC59306D9}" srcId="{B33C00E0-073A-4B44-A40D-88FCE3A8D6FD}" destId="{F386D976-41F1-4E9F-B1FD-76DD5D673144}" srcOrd="0" destOrd="0" parTransId="{7F19D7EF-8EFC-445C-8402-9C18C687C102}" sibTransId="{EDA3B48C-2317-4E68-AAE5-6B8CCC71351B}"/>
     <dgm:cxn modelId="{517618D0-FCD5-4261-9D62-52964BA2E6A9}" srcId="{6A9063C9-393F-4713-994E-5DBC2E8793BA}" destId="{AC398DB8-4438-4379-8DF1-59CFAE43554D}" srcOrd="2" destOrd="0" parTransId="{E8BF8A3A-CF2B-4C73-B479-822B9B335AF7}" sibTransId="{6683B340-CBFF-4A0D-AFBA-5FD767011E64}"/>
-    <dgm:cxn modelId="{435B24D6-6C12-4EF0-AA09-D706BCC274EE}" srcId="{DBD8F70C-BB94-409C-B7BC-5EBE4A9773C7}" destId="{44D14112-5418-4765-B504-23CF894F7A82}" srcOrd="1" destOrd="0" parTransId="{678A46B2-76AC-439F-9515-A8EDDD84528A}" sibTransId="{CE8F7B85-7020-4C1E-AF78-4904708673B8}"/>
+    <dgm:cxn modelId="{435B24D6-6C12-4EF0-AA09-D706BCC274EE}" srcId="{DBD8F70C-BB94-409C-B7BC-5EBE4A9773C7}" destId="{44D14112-5418-4765-B504-23CF894F7A82}" srcOrd="2" destOrd="0" parTransId="{678A46B2-76AC-439F-9515-A8EDDD84528A}" sibTransId="{CE8F7B85-7020-4C1E-AF78-4904708673B8}"/>
     <dgm:cxn modelId="{AE0F6FD6-4E60-4BF5-8712-B0C779BC7D3B}" srcId="{E3CBA390-CCDA-4D24-8942-073B2FC3F82C}" destId="{F3A0ABBC-C120-43FB-8BD0-E47CB026BD61}" srcOrd="1" destOrd="0" parTransId="{03B18B0D-B63B-4F99-BE94-C0BC3553BD6E}" sibTransId="{31373562-3311-4091-88FD-FBC8D6A7EF26}"/>
     <dgm:cxn modelId="{343197D6-9A20-4205-B82B-8ACB3DC94A2E}" type="presOf" srcId="{F3A0ABBC-C120-43FB-8BD0-E47CB026BD61}" destId="{0C041889-D3CC-4E93-A706-82C5850D8CE2}" srcOrd="0" destOrd="1" presId="urn:microsoft.com/office/officeart/2005/8/layout/hList1"/>
     <dgm:cxn modelId="{9CD9E8DA-3344-42E0-8E83-C78AFBE0F887}" type="presOf" srcId="{1A37949D-8DB7-4063-8B84-808827F2528D}" destId="{FBB54CEC-5096-4377-B9A0-DC1897B1C22F}" srcOrd="0" destOrd="0" presId="urn:microsoft.com/office/officeart/2005/8/layout/hList1"/>
     <dgm:cxn modelId="{728437DC-D413-4D87-A9EF-BFC26DBDB904}" srcId="{B33C00E0-073A-4B44-A40D-88FCE3A8D6FD}" destId="{785D74FD-20BE-4828-9A89-CCF66CBB5B8B}" srcOrd="2" destOrd="0" parTransId="{974DE925-76FD-4D75-9035-6EC32390B063}" sibTransId="{4954B3F9-E0F5-4037-91C3-6C2E211C3338}"/>
     <dgm:cxn modelId="{EDF118DD-AE17-4468-A5C4-162B8CA1F8B4}" type="presOf" srcId="{5B8828BD-1B60-4F20-9FBE-08EDE9B43C0C}" destId="{84A7D3E3-7DAE-4219-B934-66A7C2AF2591}" srcOrd="0" destOrd="0" presId="urn:microsoft.com/office/officeart/2005/8/layout/hList1"/>
     <dgm:cxn modelId="{C25ED9DD-4F44-4F3F-9056-60AF0D1C25CB}" srcId="{B33C00E0-073A-4B44-A40D-88FCE3A8D6FD}" destId="{C4FB268F-993F-409E-9C97-A352B9BB7909}" srcOrd="3" destOrd="0" parTransId="{D8D73AC7-1BC8-4A53-B2C2-BE3694C64794}" sibTransId="{8DBC6766-1B70-4B34-B016-586A786A2B1F}"/>
-    <dgm:cxn modelId="{3CE14BE5-9751-4B95-B3EA-5A036BE4FD97}" type="presOf" srcId="{8660B140-D3E1-4406-823F-4FD2A9D05E21}" destId="{8ED69AC3-1C3E-41B0-94A7-CB61300A7E4D}" srcOrd="0" destOrd="3" presId="urn:microsoft.com/office/officeart/2005/8/layout/hList1"/>
     <dgm:cxn modelId="{9272DCF3-C3E5-4448-8C9F-F01C58311FB3}" type="presOf" srcId="{785D74FD-20BE-4828-9A89-CCF66CBB5B8B}" destId="{273947A1-83A5-46FE-BF71-DD621ED741C4}" srcOrd="0" destOrd="2" presId="urn:microsoft.com/office/officeart/2005/8/layout/hList1"/>
     <dgm:cxn modelId="{019423FC-D1A6-4F24-8C38-AA367125DD36}" type="presOf" srcId="{69A28EE4-54A9-455B-942F-DF53DE884001}" destId="{273947A1-83A5-46FE-BF71-DD621ED741C4}" srcOrd="0" destOrd="1" presId="urn:microsoft.com/office/officeart/2005/8/layout/hList1"/>
     <dgm:cxn modelId="{5CA7F8FC-39EC-4831-A627-C1F2E4E024B7}" type="presOf" srcId="{6A9063C9-393F-4713-994E-5DBC2E8793BA}" destId="{96997970-389C-45E6-AE5F-63DCA177BFE2}" srcOrd="0" destOrd="0" presId="urn:microsoft.com/office/officeart/2005/8/layout/hList1"/>
@@ -4583,7 +4583,7 @@
       </dsp:nvSpPr>
       <dsp:spPr>
         <a:xfrm>
-          <a:off x="4747" y="787687"/>
+          <a:off x="4747" y="809711"/>
           <a:ext cx="1819826" cy="727930"/>
         </a:xfrm>
         <a:prstGeom prst="rect">
@@ -4651,7 +4651,7 @@
         </a:p>
       </dsp:txBody>
       <dsp:txXfrm>
-        <a:off x="4747" y="787687"/>
+        <a:off x="4747" y="809711"/>
         <a:ext cx="1819826" cy="727930"/>
       </dsp:txXfrm>
     </dsp:sp>
@@ -4662,8 +4662,8 @@
       </dsp:nvSpPr>
       <dsp:spPr>
         <a:xfrm>
-          <a:off x="4747" y="1515617"/>
-          <a:ext cx="1819826" cy="2810193"/>
+          <a:off x="0" y="1458696"/>
+          <a:ext cx="1819826" cy="2766145"/>
         </a:xfrm>
         <a:prstGeom prst="rect">
           <a:avLst/>
@@ -4768,29 +4768,10 @@
           </a:r>
           <a:endParaRPr lang="zh-CN" altLang="en-US" sz="2600" kern="1200" dirty="0"/>
         </a:p>
-        <a:p>
-          <a:pPr marL="228600" lvl="1" indent="-228600" algn="l" defTabSz="1155700">
-            <a:lnSpc>
-              <a:spcPct val="90000"/>
-            </a:lnSpc>
-            <a:spcBef>
-              <a:spcPct val="0"/>
-            </a:spcBef>
-            <a:spcAft>
-              <a:spcPct val="15000"/>
-            </a:spcAft>
-            <a:buChar char="•"/>
-          </a:pPr>
-          <a:r>
-            <a:rPr lang="en-US" altLang="zh-CN" sz="2600" kern="1200" dirty="0"/>
-            <a:t>odd</a:t>
-          </a:r>
-          <a:endParaRPr lang="zh-CN" altLang="en-US" sz="2600" kern="1200" dirty="0"/>
-        </a:p>
       </dsp:txBody>
       <dsp:txXfrm>
-        <a:off x="4747" y="1515617"/>
-        <a:ext cx="1819826" cy="2810193"/>
+        <a:off x="0" y="1458696"/>
+        <a:ext cx="1819826" cy="2766145"/>
       </dsp:txXfrm>
     </dsp:sp>
     <dsp:sp modelId="{4D3BFAE9-2EC0-4F19-85FD-239DA87C10B2}">
@@ -4800,7 +4781,7 @@
       </dsp:nvSpPr>
       <dsp:spPr>
         <a:xfrm>
-          <a:off x="2079349" y="787687"/>
+          <a:off x="2079349" y="809711"/>
           <a:ext cx="1819826" cy="727930"/>
         </a:xfrm>
         <a:prstGeom prst="rect">
@@ -4868,7 +4849,7 @@
         </a:p>
       </dsp:txBody>
       <dsp:txXfrm>
-        <a:off x="2079349" y="787687"/>
+        <a:off x="2079349" y="809711"/>
         <a:ext cx="1819826" cy="727930"/>
       </dsp:txXfrm>
     </dsp:sp>
@@ -4879,8 +4860,8 @@
       </dsp:nvSpPr>
       <dsp:spPr>
         <a:xfrm>
-          <a:off x="2079349" y="1515617"/>
-          <a:ext cx="1819826" cy="2810193"/>
+          <a:off x="2079349" y="1537642"/>
+          <a:ext cx="1819826" cy="2766145"/>
         </a:xfrm>
         <a:prstGeom prst="rect">
           <a:avLst/>
@@ -5006,8 +4987,8 @@
         </a:p>
       </dsp:txBody>
       <dsp:txXfrm>
-        <a:off x="2079349" y="1515617"/>
-        <a:ext cx="1819826" cy="2810193"/>
+        <a:off x="2079349" y="1537642"/>
+        <a:ext cx="1819826" cy="2766145"/>
       </dsp:txXfrm>
     </dsp:sp>
     <dsp:sp modelId="{FBB54CEC-5096-4377-B9A0-DC1897B1C22F}">
@@ -5017,7 +4998,7 @@
       </dsp:nvSpPr>
       <dsp:spPr>
         <a:xfrm>
-          <a:off x="4153951" y="787687"/>
+          <a:off x="4153951" y="809711"/>
           <a:ext cx="1819826" cy="727930"/>
         </a:xfrm>
         <a:prstGeom prst="rect">
@@ -5085,7 +5066,7 @@
         </a:p>
       </dsp:txBody>
       <dsp:txXfrm>
-        <a:off x="4153951" y="787687"/>
+        <a:off x="4153951" y="809711"/>
         <a:ext cx="1819826" cy="727930"/>
       </dsp:txXfrm>
     </dsp:sp>
@@ -5096,8 +5077,8 @@
       </dsp:nvSpPr>
       <dsp:spPr>
         <a:xfrm>
-          <a:off x="4153951" y="1515617"/>
-          <a:ext cx="1819826" cy="2810193"/>
+          <a:off x="4153951" y="1537642"/>
+          <a:ext cx="1819826" cy="2766145"/>
         </a:xfrm>
         <a:prstGeom prst="rect">
           <a:avLst/>
@@ -5223,8 +5204,8 @@
         </a:p>
       </dsp:txBody>
       <dsp:txXfrm>
-        <a:off x="4153951" y="1515617"/>
-        <a:ext cx="1819826" cy="2810193"/>
+        <a:off x="4153951" y="1537642"/>
+        <a:ext cx="1819826" cy="2766145"/>
       </dsp:txXfrm>
     </dsp:sp>
     <dsp:sp modelId="{0CD0E88C-C690-4025-9877-FDB37C930DC4}">
@@ -5234,7 +5215,7 @@
       </dsp:nvSpPr>
       <dsp:spPr>
         <a:xfrm>
-          <a:off x="6228553" y="787687"/>
+          <a:off x="6228553" y="809711"/>
           <a:ext cx="1819826" cy="727930"/>
         </a:xfrm>
         <a:prstGeom prst="rect">
@@ -5302,7 +5283,7 @@
         </a:p>
       </dsp:txBody>
       <dsp:txXfrm>
-        <a:off x="6228553" y="787687"/>
+        <a:off x="6228553" y="809711"/>
         <a:ext cx="1819826" cy="727930"/>
       </dsp:txXfrm>
     </dsp:sp>
@@ -5313,8 +5294,8 @@
       </dsp:nvSpPr>
       <dsp:spPr>
         <a:xfrm>
-          <a:off x="6228553" y="1515617"/>
-          <a:ext cx="1819826" cy="2810193"/>
+          <a:off x="6228553" y="1537642"/>
+          <a:ext cx="1819826" cy="2766145"/>
         </a:xfrm>
         <a:prstGeom prst="rect">
           <a:avLst/>
@@ -5467,8 +5448,8 @@
         </a:p>
       </dsp:txBody>
       <dsp:txXfrm>
-        <a:off x="6228553" y="1515617"/>
-        <a:ext cx="1819826" cy="2810193"/>
+        <a:off x="6228553" y="1537642"/>
+        <a:ext cx="1819826" cy="2766145"/>
       </dsp:txXfrm>
     </dsp:sp>
     <dsp:sp modelId="{42D7CF5D-C18A-48B9-BD5D-08D88E897DA7}">
@@ -5478,7 +5459,7 @@
       </dsp:nvSpPr>
       <dsp:spPr>
         <a:xfrm>
-          <a:off x="8303156" y="787687"/>
+          <a:off x="8303156" y="809711"/>
           <a:ext cx="1819826" cy="727930"/>
         </a:xfrm>
         <a:prstGeom prst="rect">
@@ -5546,7 +5527,7 @@
         </a:p>
       </dsp:txBody>
       <dsp:txXfrm>
-        <a:off x="8303156" y="787687"/>
+        <a:off x="8303156" y="809711"/>
         <a:ext cx="1819826" cy="727930"/>
       </dsp:txXfrm>
     </dsp:sp>
@@ -5557,8 +5538,8 @@
       </dsp:nvSpPr>
       <dsp:spPr>
         <a:xfrm>
-          <a:off x="8303156" y="1515617"/>
-          <a:ext cx="1819826" cy="2810193"/>
+          <a:off x="8303156" y="1537642"/>
+          <a:ext cx="1819826" cy="2766145"/>
         </a:xfrm>
         <a:prstGeom prst="rect">
           <a:avLst/>
@@ -5640,6 +5621,25 @@
           </a:pPr>
           <a:r>
             <a:rPr lang="en-US" altLang="zh-CN" sz="2600" kern="1200" dirty="0"/>
+            <a:t>odd</a:t>
+          </a:r>
+          <a:endParaRPr lang="zh-CN" altLang="en-US" sz="2600" kern="1200" dirty="0"/>
+        </a:p>
+        <a:p>
+          <a:pPr marL="228600" lvl="1" indent="-228600" algn="l" defTabSz="1155700">
+            <a:lnSpc>
+              <a:spcPct val="90000"/>
+            </a:lnSpc>
+            <a:spcBef>
+              <a:spcPct val="0"/>
+            </a:spcBef>
+            <a:spcAft>
+              <a:spcPct val="15000"/>
+            </a:spcAft>
+            <a:buChar char="•"/>
+          </a:pPr>
+          <a:r>
+            <a:rPr lang="en-US" altLang="zh-CN" sz="2600" kern="1200" dirty="0"/>
             <a:t>print</a:t>
           </a:r>
           <a:endParaRPr lang="zh-CN" altLang="en-US" sz="2600" kern="1200" dirty="0"/>
@@ -5665,8 +5665,8 @@
         </a:p>
       </dsp:txBody>
       <dsp:txXfrm>
-        <a:off x="8303156" y="1515617"/>
-        <a:ext cx="1819826" cy="2810193"/>
+        <a:off x="8303156" y="1537642"/>
+        <a:ext cx="1819826" cy="2766145"/>
       </dsp:txXfrm>
     </dsp:sp>
   </dsp:spTree>
@@ -10106,7 +10106,7 @@
           <a:p>
             <a:fld id="{56024378-00D7-45FF-AB87-4712D912B902}" type="datetimeFigureOut">
               <a:rPr lang="zh-CN" altLang="en-US" smtClean="0"/>
-              <a:t>2018/11/26</a:t>
+              <a:t>2018/11/27</a:t>
             </a:fld>
             <a:endParaRPr lang="zh-CN" altLang="en-US"/>
           </a:p>
@@ -14372,7 +14372,7 @@
           <a:p>
             <a:fld id="{021558A7-513C-47BE-9B6D-29FE45CBE407}" type="datetimeFigureOut">
               <a:rPr lang="zh-CN" altLang="en-US" smtClean="0"/>
-              <a:t>2018/11/26</a:t>
+              <a:t>2018/11/27</a:t>
             </a:fld>
             <a:endParaRPr lang="zh-CN" altLang="en-US"/>
           </a:p>
@@ -14790,13 +14790,21 @@
         <p:spPr/>
         <p:txBody>
           <a:bodyPr>
-            <a:normAutofit fontScale="85000" lnSpcReduction="10000"/>
+            <a:normAutofit fontScale="92500"/>
           </a:bodyPr>
           <a:lstStyle/>
           <a:p>
             <a:r>
               <a:rPr lang="zh-CN" altLang="en-US" dirty="0"/>
-              <a:t>小组成员</a:t>
+              <a:t>第八组</a:t>
+            </a:r>
+            <a:r>
+              <a:rPr lang="en-US" altLang="zh-CN" dirty="0">
+                <a:solidFill>
+                  <a:schemeClr val="tx1"/>
+                </a:solidFill>
+              </a:rPr>
+              <a:t>:</a:t>
             </a:r>
             <a:r>
               <a:rPr lang="en-US" altLang="zh-CN" dirty="0">
@@ -14804,7 +14812,7 @@
                   <a:srgbClr val="FF0000"/>
                 </a:solidFill>
               </a:rPr>
-              <a:t>: </a:t>
+              <a:t> </a:t>
             </a:r>
             <a:r>
               <a:rPr lang="zh-CN" altLang="en-US" dirty="0">
@@ -14972,18 +14980,6 @@
               <a:rPr lang="en-US" altLang="zh-CN" dirty="0"/>
               <a:t>level</a:t>
             </a:r>
-          </a:p>
-          <a:p>
-            <a:r>
-              <a:rPr lang="en-US" altLang="zh-CN" dirty="0"/>
-              <a:t>(environment)</a:t>
-            </a:r>
-          </a:p>
-          <a:p>
-            <a:pPr marL="0" indent="0">
-              <a:buNone/>
-            </a:pPr>
-            <a:endParaRPr lang="zh-CN" altLang="en-US" dirty="0"/>
           </a:p>
         </p:txBody>
       </p:sp>
@@ -15089,10 +15085,10 @@
       </p:sp>
       <p:pic>
         <p:nvPicPr>
-          <p:cNvPr id="9" name="图片 8">
+          <p:cNvPr id="2" name="图片 1">
             <a:extLst>
               <a:ext uri="{FF2B5EF4-FFF2-40B4-BE49-F238E27FC236}">
-                <a16:creationId xmlns:a16="http://schemas.microsoft.com/office/drawing/2014/main" id="{BFD7F4A7-B2A5-4B89-9C6D-5D989B94584B}"/>
+                <a16:creationId xmlns:a16="http://schemas.microsoft.com/office/drawing/2014/main" id="{F8C4F012-09C9-48D0-A7F0-7C593D0A053C}"/>
               </a:ext>
             </a:extLst>
           </p:cNvPr>
@@ -15109,8 +15105,8 @@
         </p:blipFill>
         <p:spPr>
           <a:xfrm>
-            <a:off x="1997242" y="1224558"/>
-            <a:ext cx="8546592" cy="5633442"/>
+            <a:off x="2105524" y="1169895"/>
+            <a:ext cx="7980952" cy="5571429"/>
           </a:xfrm>
           <a:prstGeom prst="rect">
             <a:avLst/>
@@ -15927,13 +15923,13 @@
           <a:p>
             <a:r>
               <a:rPr lang="en-US" altLang="zh-CN" sz="2800" dirty="0"/>
+              <a:t>pop</a:t>
+            </a:r>
+          </a:p>
+          <a:p>
+            <a:r>
+              <a:rPr lang="en-US" altLang="zh-CN" sz="2800" dirty="0"/>
               <a:t>push</a:t>
-            </a:r>
-          </a:p>
-          <a:p>
-            <a:r>
-              <a:rPr lang="en-US" altLang="zh-CN" sz="2800" dirty="0"/>
-              <a:t>pop</a:t>
             </a:r>
           </a:p>
         </p:txBody>
@@ -16407,6 +16403,10 @@
           <a:bodyPr/>
           <a:lstStyle/>
           <a:p>
+            <a:r>
+              <a:rPr lang="en-US" altLang="zh-CN" dirty="0"/>
+              <a:t>THANKS</a:t>
+            </a:r>
             <a:endParaRPr lang="zh-CN" altLang="en-US" dirty="0"/>
           </a:p>
         </p:txBody>
@@ -16425,8 +16425,8 @@
         </p:nvSpPr>
         <p:spPr>
           <a:xfrm>
-            <a:off x="3474867" y="5903893"/>
-            <a:ext cx="6546222" cy="954107"/>
+            <a:off x="2243594" y="6160567"/>
+            <a:ext cx="8059407" cy="523220"/>
           </a:xfrm>
           <a:prstGeom prst="rect">
             <a:avLst/>
@@ -16440,19 +16440,13 @@
           <a:lstStyle/>
           <a:p>
             <a:r>
-              <a:rPr lang="en-US" altLang="zh-CN" sz="2800" b="1" dirty="0"/>
-              <a:t>star and fork me on </a:t>
-            </a:r>
-            <a:r>
               <a:rPr lang="en-US" altLang="zh-CN" sz="2800" b="1" dirty="0" err="1"/>
               <a:t>github</a:t>
             </a:r>
             <a:r>
               <a:rPr lang="en-US" altLang="zh-CN" sz="2800" b="1" dirty="0"/>
-              <a:t>:</a:t>
-            </a:r>
-          </a:p>
-          <a:p>
+              <a:t>: </a:t>
+            </a:r>
             <a:r>
               <a:rPr lang="en-US" altLang="zh-CN" sz="2800" b="1" dirty="0">
                 <a:hlinkClick r:id="rId2"/>
@@ -17147,7 +17141,7 @@
           <p:nvPr>
             <p:extLst>
               <p:ext uri="{D42A27DB-BD31-4B8C-83A1-F6EECF244321}">
-                <p14:modId xmlns:p14="http://schemas.microsoft.com/office/powerpoint/2010/main" val="968415947"/>
+                <p14:modId xmlns:p14="http://schemas.microsoft.com/office/powerpoint/2010/main" val="547817034"/>
               </p:ext>
             </p:extLst>
           </p:nvPr>

</xml_diff>